<commit_message>
report utilization for cvicu
</commit_message>
<xml_diff>
--- a/report/sidney/utilization_slides.pptx
+++ b/report/sidney/utilization_slides.pptx
@@ -405,7 +405,7 @@
                   <c:v>3699</c:v>
                 </c:pt>
                 <c:pt idx="2">
-                  <c:v>3705</c:v>
+                  <c:v>3700</c:v>
                 </c:pt>
                 <c:pt idx="3">
                   <c:v>4329</c:v>
@@ -417,7 +417,7 @@
                   <c:v>4539</c:v>
                 </c:pt>
                 <c:pt idx="6">
-                  <c:v>4354</c:v>
+                  <c:v>4350</c:v>
                 </c:pt>
                 <c:pt idx="7">
                   <c:v>3815</c:v>
@@ -511,10 +511,10 @@
                   <c:v>4392</c:v>
                 </c:pt>
                 <c:pt idx="1">
-                  <c:v>4609</c:v>
+                  <c:v>4608</c:v>
                 </c:pt>
                 <c:pt idx="2">
-                  <c:v>4296</c:v>
+                  <c:v>4294</c:v>
                 </c:pt>
                 <c:pt idx="3">
                   <c:v>4462</c:v>
@@ -526,7 +526,7 @@
                   <c:v>3801</c:v>
                 </c:pt>
                 <c:pt idx="6">
-                  <c:v>2944</c:v>
+                  <c:v>2943</c:v>
                 </c:pt>
                 <c:pt idx="7">
                   <c:v>1981</c:v>
@@ -617,7 +617,10 @@
                 <c:formatCode>General</c:formatCode>
                 <c:ptCount val="12"/>
                 <c:pt idx="0">
-                  <c:v>1859</c:v>
+                  <c:v>1858</c:v>
+                </c:pt>
+                <c:pt idx="1">
+                  <c:v>1744</c:v>
                 </c:pt>
               </c:numCache>
             </c:numRef>
@@ -1106,6 +1109,9 @@
                 <c:pt idx="0">
                   <c:v>143</c:v>
                 </c:pt>
+                <c:pt idx="1">
+                  <c:v>121</c:v>
+                </c:pt>
               </c:numCache>
             </c:numRef>
           </c:val>
@@ -1267,7 +1273,7 @@
                   <c:v>50</c:v>
                 </c:pt>
                 <c:pt idx="1">
-                  <c:v>24</c:v>
+                  <c:v>23</c:v>
                 </c:pt>
                 <c:pt idx="2">
                   <c:v>23</c:v>
@@ -1276,16 +1282,16 @@
                   <c:v>45</c:v>
                 </c:pt>
                 <c:pt idx="4">
-                  <c:v>43</c:v>
+                  <c:v>44</c:v>
                 </c:pt>
                 <c:pt idx="5">
                   <c:v>35</c:v>
                 </c:pt>
                 <c:pt idx="6">
-                  <c:v>30</c:v>
+                  <c:v>25</c:v>
                 </c:pt>
                 <c:pt idx="7">
-                  <c:v>30</c:v>
+                  <c:v>31</c:v>
                 </c:pt>
                 <c:pt idx="8">
                   <c:v>33</c:v>
@@ -1294,7 +1300,7 @@
                   <c:v>44</c:v>
                 </c:pt>
                 <c:pt idx="10">
-                  <c:v>47</c:v>
+                  <c:v>46</c:v>
                 </c:pt>
                 <c:pt idx="11">
                   <c:v>43</c:v>
@@ -1376,7 +1382,7 @@
                   <c:v>53</c:v>
                 </c:pt>
                 <c:pt idx="1">
-                  <c:v>18</c:v>
+                  <c:v>19</c:v>
                 </c:pt>
                 <c:pt idx="2">
                   <c:v>20</c:v>
@@ -1394,7 +1400,7 @@
                   <c:v>54</c:v>
                 </c:pt>
                 <c:pt idx="7">
-                  <c:v>36</c:v>
+                  <c:v>35</c:v>
                 </c:pt>
                 <c:pt idx="8">
                   <c:v>66</c:v>
@@ -1403,7 +1409,7 @@
                   <c:v>35</c:v>
                 </c:pt>
                 <c:pt idx="10">
-                  <c:v>33</c:v>
+                  <c:v>32</c:v>
                 </c:pt>
                 <c:pt idx="11">
                   <c:v>47</c:v>
@@ -1482,7 +1488,7 @@
                 <c:formatCode>General</c:formatCode>
                 <c:ptCount val="12"/>
                 <c:pt idx="0">
-                  <c:v>39</c:v>
+                  <c:v>37</c:v>
                 </c:pt>
                 <c:pt idx="1">
                   <c:v>44</c:v>
@@ -1494,10 +1500,10 @@
                   <c:v>36</c:v>
                 </c:pt>
                 <c:pt idx="4">
-                  <c:v>36</c:v>
+                  <c:v>35</c:v>
                 </c:pt>
                 <c:pt idx="5">
-                  <c:v>32</c:v>
+                  <c:v>31</c:v>
                 </c:pt>
                 <c:pt idx="6">
                   <c:v>56</c:v>
@@ -1509,13 +1515,13 @@
                   <c:v>41</c:v>
                 </c:pt>
                 <c:pt idx="9">
-                  <c:v>60</c:v>
+                  <c:v>59</c:v>
                 </c:pt>
                 <c:pt idx="10">
                   <c:v>45</c:v>
                 </c:pt>
                 <c:pt idx="11">
-                  <c:v>51</c:v>
+                  <c:v>50</c:v>
                 </c:pt>
               </c:numCache>
             </c:numRef>
@@ -1591,7 +1597,10 @@
                 <c:formatCode>General</c:formatCode>
                 <c:ptCount val="12"/>
                 <c:pt idx="0">
-                  <c:v>55</c:v>
+                  <c:v>54</c:v>
+                </c:pt>
+                <c:pt idx="1">
+                  <c:v>46</c:v>
                 </c:pt>
               </c:numCache>
             </c:numRef>
@@ -1754,7 +1763,7 @@
                   <c:v>11</c:v>
                 </c:pt>
                 <c:pt idx="1">
-                  <c:v>11</c:v>
+                  <c:v>12</c:v>
                 </c:pt>
                 <c:pt idx="2">
                   <c:v>14</c:v>
@@ -1763,16 +1772,16 @@
                   <c:v>15</c:v>
                 </c:pt>
                 <c:pt idx="4">
-                  <c:v>19</c:v>
+                  <c:v>18</c:v>
                 </c:pt>
                 <c:pt idx="5">
                   <c:v>15</c:v>
                 </c:pt>
                 <c:pt idx="6">
-                  <c:v>15</c:v>
+                  <c:v>20</c:v>
                 </c:pt>
                 <c:pt idx="7">
-                  <c:v>18</c:v>
+                  <c:v>17</c:v>
                 </c:pt>
                 <c:pt idx="8">
                   <c:v>18</c:v>
@@ -1781,7 +1790,7 @@
                   <c:v>15</c:v>
                 </c:pt>
                 <c:pt idx="10">
-                  <c:v>16</c:v>
+                  <c:v>17</c:v>
                 </c:pt>
                 <c:pt idx="11">
                   <c:v>23</c:v>
@@ -1863,13 +1872,13 @@
                   <c:v>16</c:v>
                 </c:pt>
                 <c:pt idx="1">
-                  <c:v>19</c:v>
+                  <c:v>18</c:v>
                 </c:pt>
                 <c:pt idx="2">
                   <c:v>21</c:v>
                 </c:pt>
                 <c:pt idx="3">
-                  <c:v>17</c:v>
+                  <c:v>16</c:v>
                 </c:pt>
                 <c:pt idx="4">
                   <c:v>19</c:v>
@@ -1878,10 +1887,10 @@
                   <c:v>21</c:v>
                 </c:pt>
                 <c:pt idx="6">
-                  <c:v>17</c:v>
+                  <c:v>15</c:v>
                 </c:pt>
                 <c:pt idx="7">
-                  <c:v>19</c:v>
+                  <c:v>20</c:v>
                 </c:pt>
                 <c:pt idx="8">
                   <c:v>26</c:v>
@@ -1890,7 +1899,7 @@
                   <c:v>24</c:v>
                 </c:pt>
                 <c:pt idx="10">
-                  <c:v>20</c:v>
+                  <c:v>21</c:v>
                 </c:pt>
                 <c:pt idx="11">
                   <c:v>24</c:v>
@@ -1969,7 +1978,7 @@
                 <c:formatCode>General</c:formatCode>
                 <c:ptCount val="12"/>
                 <c:pt idx="0">
-                  <c:v>21</c:v>
+                  <c:v>23</c:v>
                 </c:pt>
                 <c:pt idx="1">
                   <c:v>20</c:v>
@@ -1984,7 +1993,7 @@
                   <c:v>20</c:v>
                 </c:pt>
                 <c:pt idx="5">
-                  <c:v>22</c:v>
+                  <c:v>23</c:v>
                 </c:pt>
                 <c:pt idx="6">
                   <c:v>28</c:v>
@@ -1996,13 +2005,13 @@
                   <c:v>24</c:v>
                 </c:pt>
                 <c:pt idx="9">
-                  <c:v>26</c:v>
+                  <c:v>27</c:v>
                 </c:pt>
                 <c:pt idx="10">
                   <c:v>21</c:v>
                 </c:pt>
                 <c:pt idx="11">
-                  <c:v>21</c:v>
+                  <c:v>22</c:v>
                 </c:pt>
               </c:numCache>
             </c:numRef>
@@ -2078,7 +2087,10 @@
                 <c:formatCode>General</c:formatCode>
                 <c:ptCount val="12"/>
                 <c:pt idx="0">
-                  <c:v>22</c:v>
+                  <c:v>23</c:v>
+                </c:pt>
+                <c:pt idx="1">
+                  <c:v>24</c:v>
                 </c:pt>
               </c:numCache>
             </c:numRef>
@@ -2567,6 +2579,9 @@
                 <c:pt idx="0">
                   <c:v>340</c:v>
                 </c:pt>
+                <c:pt idx="1">
+                  <c:v>787</c:v>
+                </c:pt>
               </c:numCache>
             </c:numRef>
           </c:val>
@@ -3054,6 +3069,9 @@
                 <c:pt idx="0">
                   <c:v>434</c:v>
                 </c:pt>
+                <c:pt idx="1">
+                  <c:v>286</c:v>
+                </c:pt>
               </c:numCache>
             </c:numRef>
           </c:val>
@@ -3541,6 +3559,9 @@
                 <c:pt idx="0">
                   <c:v>1</c:v>
                 </c:pt>
+                <c:pt idx="1">
+                  <c:v>0</c:v>
+                </c:pt>
               </c:numCache>
             </c:numRef>
           </c:val>
@@ -3838,7 +3859,7 @@
                   <c:v>4133</c:v>
                 </c:pt>
                 <c:pt idx="10">
-                  <c:v>4508</c:v>
+                  <c:v>4507</c:v>
                 </c:pt>
                 <c:pt idx="11">
                   <c:v>3045</c:v>
@@ -3923,7 +3944,7 @@
                   <c:v>3344</c:v>
                 </c:pt>
                 <c:pt idx="2">
-                  <c:v>4265</c:v>
+                  <c:v>4259</c:v>
                 </c:pt>
                 <c:pt idx="3">
                   <c:v>3526</c:v>
@@ -4027,6 +4048,9 @@
                 <c:ptCount val="12"/>
                 <c:pt idx="0">
                   <c:v>4050</c:v>
+                </c:pt>
+                <c:pt idx="1">
+                  <c:v>3343</c:v>
                 </c:pt>
               </c:numCache>
             </c:numRef>
@@ -4515,6 +4539,9 @@
                 <c:pt idx="0">
                   <c:v>27</c:v>
                 </c:pt>
+                <c:pt idx="1">
+                  <c:v>24</c:v>
+                </c:pt>
               </c:numCache>
             </c:numRef>
           </c:val>
@@ -4912,7 +4939,7 @@
                   <c:v>325</c:v>
                 </c:pt>
                 <c:pt idx="7">
-                  <c:v>286</c:v>
+                  <c:v>284</c:v>
                 </c:pt>
                 <c:pt idx="8">
                   <c:v>343</c:v>
@@ -4924,7 +4951,7 @@
                   <c:v>397</c:v>
                 </c:pt>
                 <c:pt idx="11">
-                  <c:v>334</c:v>
+                  <c:v>333</c:v>
                 </c:pt>
               </c:numCache>
             </c:numRef>
@@ -5001,6 +5028,9 @@
                 <c:ptCount val="12"/>
                 <c:pt idx="0">
                   <c:v>337</c:v>
+                </c:pt>
+                <c:pt idx="1">
+                  <c:v>344</c:v>
                 </c:pt>
               </c:numCache>
             </c:numRef>
@@ -5160,7 +5190,7 @@
                 <c:formatCode>General</c:formatCode>
                 <c:ptCount val="12"/>
                 <c:pt idx="0">
-                  <c:v>1414</c:v>
+                  <c:v>1413</c:v>
                 </c:pt>
                 <c:pt idx="1">
                   <c:v>1631</c:v>
@@ -5272,34 +5302,34 @@
                   <c:v>1206</c:v>
                 </c:pt>
                 <c:pt idx="1">
-                  <c:v>1188</c:v>
+                  <c:v>1187</c:v>
                 </c:pt>
                 <c:pt idx="2">
-                  <c:v>1374</c:v>
+                  <c:v>1373</c:v>
                 </c:pt>
                 <c:pt idx="3">
-                  <c:v>1832</c:v>
+                  <c:v>1831</c:v>
                 </c:pt>
                 <c:pt idx="4">
                   <c:v>1270</c:v>
                 </c:pt>
                 <c:pt idx="5">
-                  <c:v>1929</c:v>
+                  <c:v>1928</c:v>
                 </c:pt>
                 <c:pt idx="6">
                   <c:v>1214</c:v>
                 </c:pt>
                 <c:pt idx="7">
-                  <c:v>1055</c:v>
+                  <c:v>1052</c:v>
                 </c:pt>
                 <c:pt idx="8">
-                  <c:v>1181</c:v>
+                  <c:v>1179</c:v>
                 </c:pt>
                 <c:pt idx="9">
                   <c:v>1424</c:v>
                 </c:pt>
                 <c:pt idx="10">
-                  <c:v>1966</c:v>
+                  <c:v>1965</c:v>
                 </c:pt>
                 <c:pt idx="11">
                   <c:v>1583</c:v>
@@ -5378,7 +5408,7 @@
                 <c:formatCode>General</c:formatCode>
                 <c:ptCount val="12"/>
                 <c:pt idx="0">
-                  <c:v>1081</c:v>
+                  <c:v>1080</c:v>
                 </c:pt>
                 <c:pt idx="1">
                   <c:v>1115</c:v>
@@ -5399,7 +5429,7 @@
                   <c:v>1874</c:v>
                 </c:pt>
                 <c:pt idx="7">
-                  <c:v>1109</c:v>
+                  <c:v>1102</c:v>
                 </c:pt>
                 <c:pt idx="8">
                   <c:v>1272</c:v>
@@ -5488,6 +5518,9 @@
                 <c:ptCount val="12"/>
                 <c:pt idx="0">
                   <c:v>1111</c:v>
+                </c:pt>
+                <c:pt idx="1">
+                  <c:v>1252</c:v>
                 </c:pt>
               </c:numCache>
             </c:numRef>
@@ -5976,6 +6009,9 @@
                 <c:pt idx="0">
                   <c:v>124</c:v>
                 </c:pt>
+                <c:pt idx="1">
+                  <c:v>109</c:v>
+                </c:pt>
               </c:numCache>
             </c:numRef>
           </c:val>
@@ -6463,6 +6499,9 @@
                 <c:pt idx="0">
                   <c:v>2</c:v>
                 </c:pt>
+                <c:pt idx="1">
+                  <c:v>1</c:v>
+                </c:pt>
               </c:numCache>
             </c:numRef>
           </c:val>
@@ -6950,6 +6989,9 @@
                 <c:pt idx="0">
                   <c:v>137</c:v>
                 </c:pt>
+                <c:pt idx="1">
+                  <c:v>90</c:v>
+                </c:pt>
               </c:numCache>
             </c:numRef>
           </c:val>
@@ -7437,6 +7479,9 @@
                 <c:pt idx="0">
                   <c:v>59</c:v>
                 </c:pt>
+                <c:pt idx="1">
+                  <c:v>74</c:v>
+                </c:pt>
               </c:numCache>
             </c:numRef>
           </c:val>
@@ -7924,6 +7969,9 @@
                 <c:pt idx="0">
                   <c:v>137</c:v>
                 </c:pt>
+                <c:pt idx="1">
+                  <c:v>188</c:v>
+                </c:pt>
               </c:numCache>
             </c:numRef>
           </c:val>
@@ -8411,6 +8459,9 @@
                 <c:pt idx="0">
                   <c:v>116</c:v>
                 </c:pt>
+                <c:pt idx="1">
+                  <c:v>124</c:v>
+                </c:pt>
               </c:numCache>
             </c:numRef>
           </c:val>
@@ -8897,6 +8948,9 @@
                 <c:ptCount val="12"/>
                 <c:pt idx="0">
                   <c:v>9</c:v>
+                </c:pt>
+                <c:pt idx="1">
+                  <c:v>10</c:v>
                 </c:pt>
               </c:numCache>
             </c:numRef>
@@ -11852,7 +11906,7 @@
           <a:lstStyle/>
           <a:p>
             <a:r>
-              <a:t>Data through: July 2019</a:t>
+              <a:t>Data through: August 2019</a:t>
             </a:r>
           </a:p>
           <a:p>

</xml_diff>